<commit_message>
docs: update logo and icon
</commit_message>
<xml_diff>
--- a/src/logo/Set-OutlookSignatures Logo.pptx
+++ b/src/logo/Set-OutlookSignatures Logo.pptx
@@ -272,7 +272,7 @@
           <a:p>
             <a:fld id="{C11841D6-B7FC-4F74-87D2-69F6AB48AF83}" type="datetimeFigureOut">
               <a:rPr lang="de-AT" smtClean="0"/>
-              <a:t>06.09.2021</a:t>
+              <a:t>19.09.2022</a:t>
             </a:fld>
             <a:endParaRPr lang="de-AT"/>
           </a:p>
@@ -472,7 +472,7 @@
           <a:p>
             <a:fld id="{C11841D6-B7FC-4F74-87D2-69F6AB48AF83}" type="datetimeFigureOut">
               <a:rPr lang="de-AT" smtClean="0"/>
-              <a:t>06.09.2021</a:t>
+              <a:t>19.09.2022</a:t>
             </a:fld>
             <a:endParaRPr lang="de-AT"/>
           </a:p>
@@ -682,7 +682,7 @@
           <a:p>
             <a:fld id="{C11841D6-B7FC-4F74-87D2-69F6AB48AF83}" type="datetimeFigureOut">
               <a:rPr lang="de-AT" smtClean="0"/>
-              <a:t>06.09.2021</a:t>
+              <a:t>19.09.2022</a:t>
             </a:fld>
             <a:endParaRPr lang="de-AT"/>
           </a:p>
@@ -882,7 +882,7 @@
           <a:p>
             <a:fld id="{C11841D6-B7FC-4F74-87D2-69F6AB48AF83}" type="datetimeFigureOut">
               <a:rPr lang="de-AT" smtClean="0"/>
-              <a:t>06.09.2021</a:t>
+              <a:t>19.09.2022</a:t>
             </a:fld>
             <a:endParaRPr lang="de-AT"/>
           </a:p>
@@ -1158,7 +1158,7 @@
           <a:p>
             <a:fld id="{C11841D6-B7FC-4F74-87D2-69F6AB48AF83}" type="datetimeFigureOut">
               <a:rPr lang="de-AT" smtClean="0"/>
-              <a:t>06.09.2021</a:t>
+              <a:t>19.09.2022</a:t>
             </a:fld>
             <a:endParaRPr lang="de-AT"/>
           </a:p>
@@ -1426,7 +1426,7 @@
           <a:p>
             <a:fld id="{C11841D6-B7FC-4F74-87D2-69F6AB48AF83}" type="datetimeFigureOut">
               <a:rPr lang="de-AT" smtClean="0"/>
-              <a:t>06.09.2021</a:t>
+              <a:t>19.09.2022</a:t>
             </a:fld>
             <a:endParaRPr lang="de-AT"/>
           </a:p>
@@ -1841,7 +1841,7 @@
           <a:p>
             <a:fld id="{C11841D6-B7FC-4F74-87D2-69F6AB48AF83}" type="datetimeFigureOut">
               <a:rPr lang="de-AT" smtClean="0"/>
-              <a:t>06.09.2021</a:t>
+              <a:t>19.09.2022</a:t>
             </a:fld>
             <a:endParaRPr lang="de-AT"/>
           </a:p>
@@ -1983,7 +1983,7 @@
           <a:p>
             <a:fld id="{C11841D6-B7FC-4F74-87D2-69F6AB48AF83}" type="datetimeFigureOut">
               <a:rPr lang="de-AT" smtClean="0"/>
-              <a:t>06.09.2021</a:t>
+              <a:t>19.09.2022</a:t>
             </a:fld>
             <a:endParaRPr lang="de-AT"/>
           </a:p>
@@ -2096,7 +2096,7 @@
           <a:p>
             <a:fld id="{C11841D6-B7FC-4F74-87D2-69F6AB48AF83}" type="datetimeFigureOut">
               <a:rPr lang="de-AT" smtClean="0"/>
-              <a:t>06.09.2021</a:t>
+              <a:t>19.09.2022</a:t>
             </a:fld>
             <a:endParaRPr lang="de-AT"/>
           </a:p>
@@ -2409,7 +2409,7 @@
           <a:p>
             <a:fld id="{C11841D6-B7FC-4F74-87D2-69F6AB48AF83}" type="datetimeFigureOut">
               <a:rPr lang="de-AT" smtClean="0"/>
-              <a:t>06.09.2021</a:t>
+              <a:t>19.09.2022</a:t>
             </a:fld>
             <a:endParaRPr lang="de-AT"/>
           </a:p>
@@ -2698,7 +2698,7 @@
           <a:p>
             <a:fld id="{C11841D6-B7FC-4F74-87D2-69F6AB48AF83}" type="datetimeFigureOut">
               <a:rPr lang="de-AT" smtClean="0"/>
-              <a:t>06.09.2021</a:t>
+              <a:t>19.09.2022</a:t>
             </a:fld>
             <a:endParaRPr lang="de-AT"/>
           </a:p>
@@ -2941,7 +2941,7 @@
           <a:p>
             <a:fld id="{C11841D6-B7FC-4F74-87D2-69F6AB48AF83}" type="datetimeFigureOut">
               <a:rPr lang="de-AT" smtClean="0"/>
-              <a:t>06.09.2021</a:t>
+              <a:t>19.09.2022</a:t>
             </a:fld>
             <a:endParaRPr lang="de-AT"/>
           </a:p>
@@ -3360,111 +3360,18 @@
       </p:grpSpPr>
       <p:grpSp>
         <p:nvGrpSpPr>
-          <p:cNvPr id="5" name="Gruppieren 4">
-            <a:extLst>
-              <a:ext uri="{FF2B5EF4-FFF2-40B4-BE49-F238E27FC236}">
-                <a16:creationId xmlns:a16="http://schemas.microsoft.com/office/drawing/2014/main" id="{559633E2-B3D3-484D-AF1A-8BDC479DB339}"/>
-              </a:ext>
-            </a:extLst>
-          </p:cNvPr>
+          <p:cNvPr id="7" name="Gruppieren 6"/>
           <p:cNvGrpSpPr/>
           <p:nvPr/>
         </p:nvGrpSpPr>
         <p:grpSpPr>
           <a:xfrm>
-            <a:off x="1767840" y="2479052"/>
-            <a:ext cx="8656320" cy="2425398"/>
-            <a:chOff x="1767840" y="2479052"/>
-            <a:chExt cx="8656320" cy="2425398"/>
+            <a:off x="1663072" y="2404302"/>
+            <a:ext cx="8865856" cy="2049396"/>
+            <a:chOff x="2683410" y="3673344"/>
+            <a:chExt cx="8865856" cy="2049396"/>
           </a:xfrm>
         </p:grpSpPr>
-        <p:sp>
-          <p:nvSpPr>
-            <p:cNvPr id="23" name="Textfeld 22">
-              <a:extLst>
-                <a:ext uri="{FF2B5EF4-FFF2-40B4-BE49-F238E27FC236}">
-                  <a16:creationId xmlns:a16="http://schemas.microsoft.com/office/drawing/2014/main" id="{3DA862C7-C262-4DE7-A47F-402A58FE69C2}"/>
-                </a:ext>
-              </a:extLst>
-            </p:cNvPr>
-            <p:cNvSpPr txBox="1"/>
-            <p:nvPr/>
-          </p:nvSpPr>
-          <p:spPr>
-            <a:xfrm>
-              <a:off x="1767840" y="3673344"/>
-              <a:ext cx="8656320" cy="1231106"/>
-            </a:xfrm>
-            <a:prstGeom prst="rect">
-              <a:avLst/>
-            </a:prstGeom>
-            <a:noFill/>
-            <a:ln>
-              <a:noFill/>
-            </a:ln>
-            <a:effectLst>
-              <a:glow>
-                <a:schemeClr val="accent1">
-                  <a:alpha val="40000"/>
-                </a:schemeClr>
-              </a:glow>
-            </a:effectLst>
-          </p:spPr>
-          <p:txBody>
-            <a:bodyPr wrap="none" lIns="0" tIns="0" rIns="0" bIns="0" rtlCol="0" anchor="ctr" anchorCtr="0">
-              <a:noAutofit/>
-            </a:bodyPr>
-            <a:lstStyle/>
-            <a:p>
-              <a:pPr algn="ctr"/>
-              <a:r>
-                <a:rPr lang="de-AT" sz="8000" b="1" i="1" spc="-400" dirty="0">
-                  <a:ln w="12700">
-                    <a:noFill/>
-                  </a:ln>
-                  <a:effectLst>
-                    <a:glow rad="127000">
-                      <a:schemeClr val="bg1"/>
-                    </a:glow>
-                  </a:effectLst>
-                  <a:latin typeface="Calibri" panose="020F0502020204030204" pitchFamily="34" charset="0"/>
-                  <a:ea typeface="Verdana" panose="020B0604030504040204" pitchFamily="34" charset="0"/>
-                  <a:cs typeface="Calibri" panose="020F0502020204030204" pitchFamily="34" charset="0"/>
-                </a:rPr>
-                <a:t>Set-</a:t>
-              </a:r>
-              <a:r>
-                <a:rPr lang="de-AT" sz="8000" b="1" i="1" spc="-400" dirty="0" err="1">
-                  <a:ln w="12700">
-                    <a:noFill/>
-                  </a:ln>
-                  <a:effectLst>
-                    <a:glow rad="127000">
-                      <a:schemeClr val="bg1"/>
-                    </a:glow>
-                  </a:effectLst>
-                  <a:latin typeface="Calibri" panose="020F0502020204030204" pitchFamily="34" charset="0"/>
-                  <a:ea typeface="Verdana" panose="020B0604030504040204" pitchFamily="34" charset="0"/>
-                  <a:cs typeface="Calibri" panose="020F0502020204030204" pitchFamily="34" charset="0"/>
-                </a:rPr>
-                <a:t>OutlookSignatures</a:t>
-              </a:r>
-              <a:endParaRPr lang="de-AT" sz="8000" b="1" i="1" spc="-400" dirty="0">
-                <a:ln w="12700">
-                  <a:noFill/>
-                </a:ln>
-                <a:effectLst>
-                  <a:glow rad="127000">
-                    <a:schemeClr val="bg1"/>
-                  </a:glow>
-                </a:effectLst>
-                <a:latin typeface="Calibri" panose="020F0502020204030204" pitchFamily="34" charset="0"/>
-                <a:ea typeface="Verdana" panose="020B0604030504040204" pitchFamily="34" charset="0"/>
-                <a:cs typeface="Calibri" panose="020F0502020204030204" pitchFamily="34" charset="0"/>
-              </a:endParaRPr>
-            </a:p>
-          </p:txBody>
-        </p:sp>
         <p:grpSp>
           <p:nvGrpSpPr>
             <p:cNvPr id="8" name="Gruppieren 7">
@@ -3481,8 +3388,8 @@
           </p:nvGrpSpPr>
           <p:grpSpPr>
             <a:xfrm>
-              <a:off x="6017805" y="2479052"/>
-              <a:ext cx="1833006" cy="1453388"/>
+              <a:off x="2683410" y="3996000"/>
+              <a:ext cx="1510902" cy="1510902"/>
               <a:chOff x="6224723" y="1709839"/>
               <a:chExt cx="3109802" cy="2465757"/>
             </a:xfrm>
@@ -5699,6 +5606,161 @@
             </p:txBody>
           </p:sp>
         </p:grpSp>
+        <p:grpSp>
+          <p:nvGrpSpPr>
+            <p:cNvPr id="4" name="Gruppieren 3"/>
+            <p:cNvGrpSpPr/>
+            <p:nvPr/>
+          </p:nvGrpSpPr>
+          <p:grpSpPr>
+            <a:xfrm>
+              <a:off x="4411645" y="3673344"/>
+              <a:ext cx="7137621" cy="2049396"/>
+              <a:chOff x="1767840" y="3673344"/>
+              <a:chExt cx="8656320" cy="2049396"/>
+            </a:xfrm>
+          </p:grpSpPr>
+          <p:sp>
+            <p:nvSpPr>
+              <p:cNvPr id="23" name="Textfeld 22">
+                <a:extLst>
+                  <a:ext uri="{FF2B5EF4-FFF2-40B4-BE49-F238E27FC236}">
+                    <a16:creationId xmlns:a16="http://schemas.microsoft.com/office/drawing/2014/main" id="{3DA862C7-C262-4DE7-A47F-402A58FE69C2}"/>
+                  </a:ext>
+                </a:extLst>
+              </p:cNvPr>
+              <p:cNvSpPr txBox="1"/>
+              <p:nvPr/>
+            </p:nvSpPr>
+            <p:spPr>
+              <a:xfrm>
+                <a:off x="1767840" y="3673344"/>
+                <a:ext cx="8656320" cy="1231106"/>
+              </a:xfrm>
+              <a:prstGeom prst="rect">
+                <a:avLst/>
+              </a:prstGeom>
+              <a:noFill/>
+              <a:ln>
+                <a:noFill/>
+              </a:ln>
+              <a:effectLst>
+                <a:glow>
+                  <a:schemeClr val="accent1">
+                    <a:alpha val="40000"/>
+                  </a:schemeClr>
+                </a:glow>
+              </a:effectLst>
+            </p:spPr>
+            <p:txBody>
+              <a:bodyPr wrap="none" lIns="0" tIns="0" rIns="0" bIns="0" rtlCol="0" anchor="ctr" anchorCtr="0">
+                <a:noAutofit/>
+              </a:bodyPr>
+              <a:lstStyle/>
+              <a:p>
+                <a:r>
+                  <a:rPr lang="de-AT" sz="8000" b="1" i="1" spc="-400" dirty="0" smtClean="0">
+                    <a:ln w="12700">
+                      <a:noFill/>
+                    </a:ln>
+                    <a:effectLst>
+                      <a:glow rad="127000">
+                        <a:schemeClr val="bg1"/>
+                      </a:glow>
+                    </a:effectLst>
+                    <a:latin typeface="Calibri" panose="020F0502020204030204" pitchFamily="34" charset="0"/>
+                    <a:ea typeface="Verdana" panose="020B0604030504040204" pitchFamily="34" charset="0"/>
+                    <a:cs typeface="Calibri" panose="020F0502020204030204" pitchFamily="34" charset="0"/>
+                  </a:rPr>
+                  <a:t>Set-</a:t>
+                </a:r>
+                <a:endParaRPr lang="de-AT" sz="8000" b="1" i="1" spc="-400" dirty="0">
+                  <a:ln w="12700">
+                    <a:noFill/>
+                  </a:ln>
+                  <a:effectLst>
+                    <a:glow rad="127000">
+                      <a:schemeClr val="bg1"/>
+                    </a:glow>
+                  </a:effectLst>
+                  <a:latin typeface="Calibri" panose="020F0502020204030204" pitchFamily="34" charset="0"/>
+                  <a:ea typeface="Verdana" panose="020B0604030504040204" pitchFamily="34" charset="0"/>
+                  <a:cs typeface="Calibri" panose="020F0502020204030204" pitchFamily="34" charset="0"/>
+                </a:endParaRPr>
+              </a:p>
+            </p:txBody>
+          </p:sp>
+          <p:sp>
+            <p:nvSpPr>
+              <p:cNvPr id="11" name="Textfeld 10">
+                <a:extLst>
+                  <a:ext uri="{FF2B5EF4-FFF2-40B4-BE49-F238E27FC236}">
+                    <a16:creationId xmlns:a16="http://schemas.microsoft.com/office/drawing/2014/main" id="{3DA862C7-C262-4DE7-A47F-402A58FE69C2}"/>
+                  </a:ext>
+                </a:extLst>
+              </p:cNvPr>
+              <p:cNvSpPr txBox="1"/>
+              <p:nvPr/>
+            </p:nvSpPr>
+            <p:spPr>
+              <a:xfrm>
+                <a:off x="1767840" y="4491634"/>
+                <a:ext cx="8656320" cy="1231106"/>
+              </a:xfrm>
+              <a:prstGeom prst="rect">
+                <a:avLst/>
+              </a:prstGeom>
+              <a:noFill/>
+              <a:ln>
+                <a:noFill/>
+              </a:ln>
+              <a:effectLst>
+                <a:glow>
+                  <a:schemeClr val="accent1">
+                    <a:alpha val="40000"/>
+                  </a:schemeClr>
+                </a:glow>
+              </a:effectLst>
+            </p:spPr>
+            <p:txBody>
+              <a:bodyPr wrap="none" lIns="0" tIns="0" rIns="0" bIns="0" rtlCol="0" anchor="ctr" anchorCtr="0">
+                <a:noAutofit/>
+              </a:bodyPr>
+              <a:lstStyle/>
+              <a:p>
+                <a:r>
+                  <a:rPr lang="de-AT" sz="8000" b="1" i="1" spc="-400" dirty="0" err="1" smtClean="0">
+                    <a:ln w="12700">
+                      <a:noFill/>
+                    </a:ln>
+                    <a:effectLst>
+                      <a:glow rad="127000">
+                        <a:schemeClr val="bg1"/>
+                      </a:glow>
+                    </a:effectLst>
+                    <a:latin typeface="Calibri" panose="020F0502020204030204" pitchFamily="34" charset="0"/>
+                    <a:ea typeface="Verdana" panose="020B0604030504040204" pitchFamily="34" charset="0"/>
+                    <a:cs typeface="Calibri" panose="020F0502020204030204" pitchFamily="34" charset="0"/>
+                  </a:rPr>
+                  <a:t>OutlookSignatures</a:t>
+                </a:r>
+                <a:endParaRPr lang="de-AT" sz="8000" b="1" i="1" spc="-400" dirty="0">
+                  <a:ln w="12700">
+                    <a:noFill/>
+                  </a:ln>
+                  <a:effectLst>
+                    <a:glow rad="127000">
+                      <a:schemeClr val="bg1"/>
+                    </a:glow>
+                  </a:effectLst>
+                  <a:latin typeface="Calibri" panose="020F0502020204030204" pitchFamily="34" charset="0"/>
+                  <a:ea typeface="Verdana" panose="020B0604030504040204" pitchFamily="34" charset="0"/>
+                  <a:cs typeface="Calibri" panose="020F0502020204030204" pitchFamily="34" charset="0"/>
+                </a:endParaRPr>
+              </a:p>
+            </p:txBody>
+          </p:sp>
+        </p:grpSp>
       </p:grpSp>
     </p:spTree>
     <p:extLst>

</xml_diff>